<commit_message>
add metrics for comparing models
</commit_message>
<xml_diff>
--- a/CourseAdmin/E5072Weekend_v2.pptx
+++ b/CourseAdmin/E5072Weekend_v2.pptx
@@ -4933,7 +4933,7 @@
           </a:p>
           <a:p>
             <a:r>
-              <a:rPr lang="en-US" smtClean="0"/>
+              <a:rPr lang="en-US" dirty="0" smtClean="0"/>
               <a:t>Pre-work </a:t>
             </a:r>
             <a:r>
@@ -5334,7 +5334,19 @@
             </a:r>
             <a:r>
               <a:rPr lang="en-US" dirty="0" smtClean="0"/>
-              <a:t> problem is the team going to solve? How and why did you decide to focus on this problem?</a:t>
+              <a:t> problem is the team going to solve? How and why did </a:t>
+            </a:r>
+            <a:r>
+              <a:rPr lang="en-US" dirty="0" smtClean="0"/>
+              <a:t>we</a:t>
+            </a:r>
+            <a:r>
+              <a:rPr lang="en-US" dirty="0" smtClean="0"/>
+              <a:t> </a:t>
+            </a:r>
+            <a:r>
+              <a:rPr lang="en-US" dirty="0" smtClean="0"/>
+              <a:t>decide to focus on this problem?</a:t>
             </a:r>
           </a:p>
           <a:p>

</xml_diff>

<commit_message>
how to choose a model
</commit_message>
<xml_diff>
--- a/CourseAdmin/E5072Weekend_v2.pptx
+++ b/CourseAdmin/E5072Weekend_v2.pptx
@@ -211,7 +211,7 @@
           <a:p>
             <a:fld id="{0A3CE07D-E24D-1946-829B-94070D81B3C6}" type="datetimeFigureOut">
               <a:rPr lang="en-US" smtClean="0"/>
-              <a:t>10/16/17</a:t>
+              <a:t>10/26/17</a:t>
             </a:fld>
             <a:endParaRPr lang="en-US"/>
           </a:p>
@@ -1071,7 +1071,7 @@
           <a:p>
             <a:fld id="{4BDF68E2-58F2-4D09-BE8B-E3BD06533059}" type="datetimeFigureOut">
               <a:rPr lang="en-US" smtClean="0"/>
-              <a:t>10/16/17</a:t>
+              <a:t>10/26/17</a:t>
             </a:fld>
             <a:endParaRPr lang="en-US" dirty="0"/>
           </a:p>
@@ -1251,7 +1251,7 @@
           <a:p>
             <a:fld id="{2E2D6473-DF6D-4702-B328-E0DD40540A4E}" type="datetimeFigureOut">
               <a:rPr lang="en-US" smtClean="0"/>
-              <a:t>10/16/17</a:t>
+              <a:t>10/26/17</a:t>
             </a:fld>
             <a:endParaRPr lang="en-US" dirty="0"/>
           </a:p>
@@ -1427,7 +1427,7 @@
           <a:p>
             <a:fld id="{E26F7E3A-B166-407D-9866-32884E7D5B37}" type="datetimeFigureOut">
               <a:rPr lang="en-US" smtClean="0"/>
-              <a:t>10/16/17</a:t>
+              <a:t>10/26/17</a:t>
             </a:fld>
             <a:endParaRPr lang="en-US" dirty="0"/>
           </a:p>
@@ -1619,7 +1619,7 @@
           <a:p>
             <a:fld id="{528FC5F6-F338-4AE4-BB23-26385BCFC423}" type="datetimeFigureOut">
               <a:rPr lang="en-US" smtClean="0"/>
-              <a:t>10/16/17</a:t>
+              <a:t>10/26/17</a:t>
             </a:fld>
             <a:endParaRPr lang="en-US" dirty="0"/>
           </a:p>
@@ -1936,7 +1936,7 @@
           <a:p>
             <a:fld id="{20EBB0C4-6273-4C6E-B9BD-2EDC30F1CD52}" type="datetimeFigureOut">
               <a:rPr lang="en-US" smtClean="0"/>
-              <a:t>10/16/17</a:t>
+              <a:t>10/26/17</a:t>
             </a:fld>
             <a:endParaRPr lang="en-US" dirty="0"/>
           </a:p>
@@ -2397,7 +2397,7 @@
           <a:p>
             <a:fld id="{19AB4D41-86C1-4908-B66A-0B50CEB3BF29}" type="datetimeFigureOut">
               <a:rPr lang="en-US" smtClean="0"/>
-              <a:t>10/16/17</a:t>
+              <a:t>10/26/17</a:t>
             </a:fld>
             <a:endParaRPr lang="en-US" dirty="0"/>
           </a:p>
@@ -2804,7 +2804,7 @@
           <a:p>
             <a:fld id="{E6426E2C-56C1-4E0D-A793-0088A7FDD37E}" type="datetimeFigureOut">
               <a:rPr lang="en-US" smtClean="0"/>
-              <a:t>10/16/17</a:t>
+              <a:t>10/26/17</a:t>
             </a:fld>
             <a:endParaRPr lang="en-US" dirty="0"/>
           </a:p>
@@ -2918,7 +2918,7 @@
           <a:p>
             <a:fld id="{C8C39B41-D8B5-4052-B551-9B5525EAA8B6}" type="datetimeFigureOut">
               <a:rPr lang="en-US" smtClean="0"/>
-              <a:t>10/16/17</a:t>
+              <a:t>10/26/17</a:t>
             </a:fld>
             <a:endParaRPr lang="en-US" dirty="0"/>
           </a:p>
@@ -3032,7 +3032,7 @@
           <a:p>
             <a:fld id="{4D94136C-8742-45B2-AF27-D93DF72833A9}" type="datetimeFigureOut">
               <a:rPr lang="en-US" smtClean="0"/>
-              <a:t>10/16/17</a:t>
+              <a:t>10/26/17</a:t>
             </a:fld>
             <a:endParaRPr lang="en-US" dirty="0"/>
           </a:p>
@@ -3392,7 +3392,7 @@
           <a:p>
             <a:fld id="{32ABBEA6-7C60-4B02-AE87-00D78D8422AF}" type="datetimeFigureOut">
               <a:rPr lang="en-US" smtClean="0"/>
-              <a:t>10/16/17</a:t>
+              <a:t>10/26/17</a:t>
             </a:fld>
             <a:endParaRPr lang="en-US" dirty="0"/>
           </a:p>
@@ -3901,7 +3901,7 @@
           <a:p>
             <a:fld id="{C9CAD897-D46E-4AD2-BD9B-49DD3E640873}" type="datetimeFigureOut">
               <a:rPr lang="en-US" smtClean="0"/>
-              <a:t>10/16/17</a:t>
+              <a:t>10/26/17</a:t>
             </a:fld>
             <a:endParaRPr lang="en-US" dirty="0"/>
           </a:p>
@@ -4252,7 +4252,7 @@
           <a:p>
             <a:fld id="{98624D31-43A5-475A-80CF-332C9F6DCF35}" type="datetimeFigureOut">
               <a:rPr lang="en-US" smtClean="0"/>
-              <a:t>10/16/17</a:t>
+              <a:t>10/26/17</a:t>
             </a:fld>
             <a:endParaRPr lang="en-US" dirty="0"/>
           </a:p>
@@ -4934,11 +4934,7 @@
           <a:p>
             <a:r>
               <a:rPr lang="en-US" dirty="0" smtClean="0"/>
-              <a:t>Pre-work </a:t>
-            </a:r>
-            <a:r>
-              <a:rPr lang="en-US" dirty="0" smtClean="0"/>
-              <a:t>in October/November to prepare Team Presentation</a:t>
+              <a:t>Pre-work in October/November to prepare Team Presentation</a:t>
             </a:r>
           </a:p>
           <a:p>
@@ -5162,9 +5158,6 @@
           <a:p>
             <a:endParaRPr lang="en-US" dirty="0" smtClean="0"/>
           </a:p>
-          <a:p>
-            <a:endParaRPr lang="en-US" dirty="0" smtClean="0"/>
-          </a:p>
         </p:txBody>
       </p:sp>
       <p:sp>
@@ -5286,7 +5279,7 @@
         </p:spPr>
         <p:txBody>
           <a:bodyPr>
-            <a:normAutofit/>
+            <a:normAutofit fontScale="92500" lnSpcReduction="20000"/>
           </a:bodyPr>
           <a:lstStyle/>
           <a:p>
@@ -5313,8 +5306,13 @@
             <a:pPr lvl="1"/>
             <a:r>
               <a:rPr lang="en-US" dirty="0" smtClean="0"/>
-              <a:t>List of business problems that can be solved by logistic regression (features, target)</a:t>
-            </a:r>
+              <a:t>List of business problems that can be solved by logistic regression (features, target</a:t>
+            </a:r>
+            <a:r>
+              <a:rPr lang="en-US" dirty="0" smtClean="0"/>
+              <a:t>)</a:t>
+            </a:r>
+            <a:endParaRPr lang="en-US" dirty="0" smtClean="0"/>
           </a:p>
           <a:p>
             <a:r>
@@ -5334,19 +5332,18 @@
             </a:r>
             <a:r>
               <a:rPr lang="en-US" dirty="0" smtClean="0"/>
-              <a:t> problem is the team going to solve? How and why did </a:t>
+              <a:t> problem is the team going to solve? How and why did we decide to focus on this problem</a:t>
             </a:r>
             <a:r>
               <a:rPr lang="en-US" dirty="0" smtClean="0"/>
-              <a:t>we</a:t>
-            </a:r>
+              <a:t>?</a:t>
+            </a:r>
+          </a:p>
+          <a:p>
+            <a:pPr lvl="1"/>
             <a:r>
               <a:rPr lang="en-US" dirty="0" smtClean="0"/>
-              <a:t> </a:t>
-            </a:r>
-            <a:r>
-              <a:rPr lang="en-US" dirty="0" smtClean="0"/>
-              <a:t>decide to focus on this problem?</a:t>
+              <a:t>What steps will you take to solve the problem? List the steps clearly. </a:t>
             </a:r>
           </a:p>
           <a:p>
@@ -5354,30 +5351,63 @@
               <a:rPr lang="en-US" dirty="0" smtClean="0"/>
               <a:t>Solve</a:t>
             </a:r>
+            <a:endParaRPr lang="en-US" dirty="0" smtClean="0"/>
           </a:p>
           <a:p>
             <a:pPr lvl="1"/>
+            <a:r>
+              <a:rPr lang="en-US" dirty="0"/>
+              <a:t>For each step in your solution describe the inputs, the manipulations that take place, the outputs produced</a:t>
+            </a:r>
+            <a:r>
+              <a:rPr lang="en-US" dirty="0" smtClean="0"/>
+              <a:t>. Steps you’ll probably use:</a:t>
+            </a:r>
+            <a:endParaRPr lang="en-US" dirty="0" smtClean="0"/>
+          </a:p>
+          <a:p>
+            <a:pPr lvl="2"/>
             <a:r>
               <a:rPr lang="en-US" dirty="0" smtClean="0"/>
               <a:t>Visualize</a:t>
             </a:r>
-          </a:p>
-          <a:p>
-            <a:pPr lvl="1"/>
+            <a:endParaRPr lang="en-US" dirty="0" smtClean="0"/>
+          </a:p>
+          <a:p>
+            <a:pPr lvl="2"/>
             <a:r>
               <a:rPr lang="en-US" dirty="0" smtClean="0"/>
               <a:t>Select/construct features</a:t>
             </a:r>
           </a:p>
           <a:p>
-            <a:pPr lvl="1"/>
+            <a:pPr lvl="2"/>
+            <a:r>
+              <a:rPr lang="mr-IN" dirty="0" smtClean="0"/>
+              <a:t>…</a:t>
+            </a:r>
+            <a:endParaRPr lang="en-US" dirty="0" smtClean="0"/>
+          </a:p>
+          <a:p>
+            <a:pPr lvl="2"/>
             <a:r>
               <a:rPr lang="en-US" dirty="0" smtClean="0"/>
-              <a:t>Create models and select the one that works best</a:t>
-            </a:r>
-          </a:p>
-          <a:p>
-            <a:pPr lvl="1"/>
+              <a:t>Create models and select the one that works </a:t>
+            </a:r>
+            <a:r>
+              <a:rPr lang="en-US" dirty="0" smtClean="0"/>
+              <a:t>best</a:t>
+            </a:r>
+          </a:p>
+          <a:p>
+            <a:pPr lvl="2"/>
+            <a:r>
+              <a:rPr lang="mr-IN" dirty="0" smtClean="0"/>
+              <a:t>…</a:t>
+            </a:r>
+            <a:endParaRPr lang="en-US" dirty="0" smtClean="0"/>
+          </a:p>
+          <a:p>
             <a:r>
               <a:rPr lang="en-US" dirty="0" smtClean="0"/>
               <a:t>Write up your results</a:t>

</xml_diff>